<commit_message>
added pointlist class (pointcloud is just another name for pointlist) polygon fitting checks for collisions now
</commit_message>
<xml_diff>
--- a/docs/vision.pptx
+++ b/docs/vision.pptx
@@ -4224,7 +4224,7 @@
           <a:p>
             <a:fld id="{7E349EBC-E665-401F-8565-41EC489DE4F8}" type="datetimeFigureOut">
               <a:rPr lang="nl-NL" smtClean="0"/>
-              <a:t>12-9-2024</a:t>
+              <a:t>25-9-2024</a:t>
             </a:fld>
             <a:endParaRPr lang="nl-NL"/>
           </a:p>
@@ -4424,7 +4424,7 @@
           <a:p>
             <a:fld id="{7E349EBC-E665-401F-8565-41EC489DE4F8}" type="datetimeFigureOut">
               <a:rPr lang="nl-NL" smtClean="0"/>
-              <a:t>12-9-2024</a:t>
+              <a:t>25-9-2024</a:t>
             </a:fld>
             <a:endParaRPr lang="nl-NL"/>
           </a:p>
@@ -4634,7 +4634,7 @@
           <a:p>
             <a:fld id="{7E349EBC-E665-401F-8565-41EC489DE4F8}" type="datetimeFigureOut">
               <a:rPr lang="nl-NL" smtClean="0"/>
-              <a:t>12-9-2024</a:t>
+              <a:t>25-9-2024</a:t>
             </a:fld>
             <a:endParaRPr lang="nl-NL"/>
           </a:p>
@@ -4834,7 +4834,7 @@
           <a:p>
             <a:fld id="{7E349EBC-E665-401F-8565-41EC489DE4F8}" type="datetimeFigureOut">
               <a:rPr lang="nl-NL" smtClean="0"/>
-              <a:t>12-9-2024</a:t>
+              <a:t>25-9-2024</a:t>
             </a:fld>
             <a:endParaRPr lang="nl-NL"/>
           </a:p>
@@ -5110,7 +5110,7 @@
           <a:p>
             <a:fld id="{7E349EBC-E665-401F-8565-41EC489DE4F8}" type="datetimeFigureOut">
               <a:rPr lang="nl-NL" smtClean="0"/>
-              <a:t>12-9-2024</a:t>
+              <a:t>25-9-2024</a:t>
             </a:fld>
             <a:endParaRPr lang="nl-NL"/>
           </a:p>
@@ -5378,7 +5378,7 @@
           <a:p>
             <a:fld id="{7E349EBC-E665-401F-8565-41EC489DE4F8}" type="datetimeFigureOut">
               <a:rPr lang="nl-NL" smtClean="0"/>
-              <a:t>12-9-2024</a:t>
+              <a:t>25-9-2024</a:t>
             </a:fld>
             <a:endParaRPr lang="nl-NL"/>
           </a:p>
@@ -5793,7 +5793,7 @@
           <a:p>
             <a:fld id="{7E349EBC-E665-401F-8565-41EC489DE4F8}" type="datetimeFigureOut">
               <a:rPr lang="nl-NL" smtClean="0"/>
-              <a:t>12-9-2024</a:t>
+              <a:t>25-9-2024</a:t>
             </a:fld>
             <a:endParaRPr lang="nl-NL"/>
           </a:p>
@@ -5935,7 +5935,7 @@
           <a:p>
             <a:fld id="{7E349EBC-E665-401F-8565-41EC489DE4F8}" type="datetimeFigureOut">
               <a:rPr lang="nl-NL" smtClean="0"/>
-              <a:t>12-9-2024</a:t>
+              <a:t>25-9-2024</a:t>
             </a:fld>
             <a:endParaRPr lang="nl-NL"/>
           </a:p>
@@ -6048,7 +6048,7 @@
           <a:p>
             <a:fld id="{7E349EBC-E665-401F-8565-41EC489DE4F8}" type="datetimeFigureOut">
               <a:rPr lang="nl-NL" smtClean="0"/>
-              <a:t>12-9-2024</a:t>
+              <a:t>25-9-2024</a:t>
             </a:fld>
             <a:endParaRPr lang="nl-NL"/>
           </a:p>
@@ -6361,7 +6361,7 @@
           <a:p>
             <a:fld id="{7E349EBC-E665-401F-8565-41EC489DE4F8}" type="datetimeFigureOut">
               <a:rPr lang="nl-NL" smtClean="0"/>
-              <a:t>12-9-2024</a:t>
+              <a:t>25-9-2024</a:t>
             </a:fld>
             <a:endParaRPr lang="nl-NL"/>
           </a:p>
@@ -6650,7 +6650,7 @@
           <a:p>
             <a:fld id="{7E349EBC-E665-401F-8565-41EC489DE4F8}" type="datetimeFigureOut">
               <a:rPr lang="nl-NL" smtClean="0"/>
-              <a:t>12-9-2024</a:t>
+              <a:t>25-9-2024</a:t>
             </a:fld>
             <a:endParaRPr lang="nl-NL"/>
           </a:p>
@@ -6893,7 +6893,7 @@
           <a:p>
             <a:fld id="{7E349EBC-E665-401F-8565-41EC489DE4F8}" type="datetimeFigureOut">
               <a:rPr lang="nl-NL" smtClean="0"/>
-              <a:t>12-9-2024</a:t>
+              <a:t>25-9-2024</a:t>
             </a:fld>
             <a:endParaRPr lang="nl-NL"/>
           </a:p>

</xml_diff>

<commit_message>
added test data. not working with test data yet (weird glitch)
</commit_message>
<xml_diff>
--- a/docs/vision.pptx
+++ b/docs/vision.pptx
@@ -6,6 +6,7 @@
   </p:sldMasterIdLst>
   <p:sldIdLst>
     <p:sldId id="256" r:id="rId2"/>
+    <p:sldId id="257" r:id="rId3"/>
   </p:sldIdLst>
   <p:sldSz cx="12192000" cy="6858000"/>
   <p:notesSz cx="6858000" cy="9144000"/>
@@ -7387,6 +7388,144 @@
 </p:sld>
 </file>
 
+<file path=ppt/slides/slide2.xml><?xml version="1.0" encoding="utf-8"?>
+<p:sld xmlns:a="http://schemas.openxmlformats.org/drawingml/2006/main" xmlns:r="http://schemas.openxmlformats.org/officeDocument/2006/relationships" xmlns:p="http://schemas.openxmlformats.org/presentationml/2006/main">
+  <p:cSld>
+    <p:spTree>
+      <p:nvGrpSpPr>
+        <p:cNvPr id="1" name=""/>
+        <p:cNvGrpSpPr/>
+        <p:nvPr/>
+      </p:nvGrpSpPr>
+      <p:grpSpPr>
+        <a:xfrm>
+          <a:off x="0" y="0"/>
+          <a:ext cx="0" cy="0"/>
+          <a:chOff x="0" y="0"/>
+          <a:chExt cx="0" cy="0"/>
+        </a:xfrm>
+      </p:grpSpPr>
+      <p:sp>
+        <p:nvSpPr>
+          <p:cNvPr id="4" name="TextBox 3">
+            <a:extLst>
+              <a:ext uri="{FF2B5EF4-FFF2-40B4-BE49-F238E27FC236}">
+                <a16:creationId xmlns:a16="http://schemas.microsoft.com/office/drawing/2014/main" id="{C2FED47B-F4D8-B8EA-A646-39161F530637}"/>
+              </a:ext>
+            </a:extLst>
+          </p:cNvPr>
+          <p:cNvSpPr txBox="1"/>
+          <p:nvPr/>
+        </p:nvSpPr>
+        <p:spPr>
+          <a:xfrm>
+            <a:off x="1820174" y="1000664"/>
+            <a:ext cx="1370824" cy="369332"/>
+          </a:xfrm>
+          <a:prstGeom prst="rect">
+            <a:avLst/>
+          </a:prstGeom>
+          <a:noFill/>
+        </p:spPr>
+        <p:txBody>
+          <a:bodyPr wrap="none" rtlCol="0">
+            <a:spAutoFit/>
+          </a:bodyPr>
+          <a:lstStyle/>
+          <a:p>
+            <a:r>
+              <a:rPr lang="en-US" dirty="0"/>
+              <a:t>Shape fitting</a:t>
+            </a:r>
+          </a:p>
+        </p:txBody>
+      </p:sp>
+      <p:sp>
+        <p:nvSpPr>
+          <p:cNvPr id="5" name="TextBox 4">
+            <a:extLst>
+              <a:ext uri="{FF2B5EF4-FFF2-40B4-BE49-F238E27FC236}">
+                <a16:creationId xmlns:a16="http://schemas.microsoft.com/office/drawing/2014/main" id="{B3054A36-E6AB-91C8-D30E-8242544D5017}"/>
+              </a:ext>
+            </a:extLst>
+          </p:cNvPr>
+          <p:cNvSpPr txBox="1"/>
+          <p:nvPr/>
+        </p:nvSpPr>
+        <p:spPr>
+          <a:xfrm>
+            <a:off x="491706" y="1509622"/>
+            <a:ext cx="11559396" cy="2308324"/>
+          </a:xfrm>
+          <a:prstGeom prst="rect">
+            <a:avLst/>
+          </a:prstGeom>
+          <a:noFill/>
+        </p:spPr>
+        <p:txBody>
+          <a:bodyPr wrap="square" rtlCol="0">
+            <a:spAutoFit/>
+          </a:bodyPr>
+          <a:lstStyle/>
+          <a:p>
+            <a:r>
+              <a:rPr lang="en-US" dirty="0"/>
+              <a:t>We have a certain set of shapes, resulting from our design.</a:t>
+            </a:r>
+          </a:p>
+          <a:p>
+            <a:r>
+              <a:rPr lang="en-US" dirty="0"/>
+              <a:t>These shapes need to be cut by the factory from ‘parent plates’.</a:t>
+            </a:r>
+            <a:br>
+              <a:rPr lang="en-US" dirty="0"/>
+            </a:br>
+            <a:r>
+              <a:rPr lang="en-US" dirty="0"/>
+              <a:t>‘parent plates’ range from 8 to 14 meters.</a:t>
+            </a:r>
+          </a:p>
+          <a:p>
+            <a:r>
+              <a:rPr lang="en-US" dirty="0"/>
+              <a:t>The cutting results of each plate will get shipped at once, and we can’t have lots of cut wood waiting at the building site.</a:t>
+            </a:r>
+          </a:p>
+          <a:p>
+            <a:r>
+              <a:rPr lang="en-US" dirty="0"/>
+              <a:t>This means that we first need to cut the shapes we need first, etc.</a:t>
+            </a:r>
+          </a:p>
+          <a:p>
+            <a:r>
+              <a:rPr lang="en-US" dirty="0"/>
+              <a:t>Sometimes, when a shape would’ve fit perfectly in a plate cut later, it can’t be cut from that plate, because we need it sooner.</a:t>
+            </a:r>
+          </a:p>
+          <a:p>
+            <a:r>
+              <a:rPr lang="en-US" dirty="0"/>
+              <a:t>Plates have a thickness. We need to fit them in the truck well and cut from parent plates with the right thickness.</a:t>
+            </a:r>
+            <a:endParaRPr lang="nl-NL" dirty="0"/>
+          </a:p>
+        </p:txBody>
+      </p:sp>
+    </p:spTree>
+    <p:extLst>
+      <p:ext uri="{BB962C8B-B14F-4D97-AF65-F5344CB8AC3E}">
+        <p14:creationId xmlns:p14="http://schemas.microsoft.com/office/powerpoint/2010/main" val="3719461517"/>
+      </p:ext>
+    </p:extLst>
+  </p:cSld>
+  <p:clrMapOvr>
+    <a:masterClrMapping/>
+  </p:clrMapOvr>
+</p:sld>
+</file>
+
 <file path=ppt/theme/theme1.xml><?xml version="1.0" encoding="utf-8"?>
 <a:theme xmlns:a="http://schemas.openxmlformats.org/drawingml/2006/main" name="Office Theme">
   <a:themeElements>

</xml_diff>

<commit_message>
stopped using references, fitting works but doesn't look clean visually
</commit_message>
<xml_diff>
--- a/docs/vision.pptx
+++ b/docs/vision.pptx
@@ -4225,7 +4225,7 @@
           <a:p>
             <a:fld id="{7E349EBC-E665-401F-8565-41EC489DE4F8}" type="datetimeFigureOut">
               <a:rPr lang="nl-NL" smtClean="0"/>
-              <a:t>25-9-2024</a:t>
+              <a:t>27-9-2024</a:t>
             </a:fld>
             <a:endParaRPr lang="nl-NL"/>
           </a:p>
@@ -4425,7 +4425,7 @@
           <a:p>
             <a:fld id="{7E349EBC-E665-401F-8565-41EC489DE4F8}" type="datetimeFigureOut">
               <a:rPr lang="nl-NL" smtClean="0"/>
-              <a:t>25-9-2024</a:t>
+              <a:t>27-9-2024</a:t>
             </a:fld>
             <a:endParaRPr lang="nl-NL"/>
           </a:p>
@@ -4635,7 +4635,7 @@
           <a:p>
             <a:fld id="{7E349EBC-E665-401F-8565-41EC489DE4F8}" type="datetimeFigureOut">
               <a:rPr lang="nl-NL" smtClean="0"/>
-              <a:t>25-9-2024</a:t>
+              <a:t>27-9-2024</a:t>
             </a:fld>
             <a:endParaRPr lang="nl-NL"/>
           </a:p>
@@ -4835,7 +4835,7 @@
           <a:p>
             <a:fld id="{7E349EBC-E665-401F-8565-41EC489DE4F8}" type="datetimeFigureOut">
               <a:rPr lang="nl-NL" smtClean="0"/>
-              <a:t>25-9-2024</a:t>
+              <a:t>27-9-2024</a:t>
             </a:fld>
             <a:endParaRPr lang="nl-NL"/>
           </a:p>
@@ -5111,7 +5111,7 @@
           <a:p>
             <a:fld id="{7E349EBC-E665-401F-8565-41EC489DE4F8}" type="datetimeFigureOut">
               <a:rPr lang="nl-NL" smtClean="0"/>
-              <a:t>25-9-2024</a:t>
+              <a:t>27-9-2024</a:t>
             </a:fld>
             <a:endParaRPr lang="nl-NL"/>
           </a:p>
@@ -5379,7 +5379,7 @@
           <a:p>
             <a:fld id="{7E349EBC-E665-401F-8565-41EC489DE4F8}" type="datetimeFigureOut">
               <a:rPr lang="nl-NL" smtClean="0"/>
-              <a:t>25-9-2024</a:t>
+              <a:t>27-9-2024</a:t>
             </a:fld>
             <a:endParaRPr lang="nl-NL"/>
           </a:p>
@@ -5794,7 +5794,7 @@
           <a:p>
             <a:fld id="{7E349EBC-E665-401F-8565-41EC489DE4F8}" type="datetimeFigureOut">
               <a:rPr lang="nl-NL" smtClean="0"/>
-              <a:t>25-9-2024</a:t>
+              <a:t>27-9-2024</a:t>
             </a:fld>
             <a:endParaRPr lang="nl-NL"/>
           </a:p>
@@ -5936,7 +5936,7 @@
           <a:p>
             <a:fld id="{7E349EBC-E665-401F-8565-41EC489DE4F8}" type="datetimeFigureOut">
               <a:rPr lang="nl-NL" smtClean="0"/>
-              <a:t>25-9-2024</a:t>
+              <a:t>27-9-2024</a:t>
             </a:fld>
             <a:endParaRPr lang="nl-NL"/>
           </a:p>
@@ -6049,7 +6049,7 @@
           <a:p>
             <a:fld id="{7E349EBC-E665-401F-8565-41EC489DE4F8}" type="datetimeFigureOut">
               <a:rPr lang="nl-NL" smtClean="0"/>
-              <a:t>25-9-2024</a:t>
+              <a:t>27-9-2024</a:t>
             </a:fld>
             <a:endParaRPr lang="nl-NL"/>
           </a:p>
@@ -6362,7 +6362,7 @@
           <a:p>
             <a:fld id="{7E349EBC-E665-401F-8565-41EC489DE4F8}" type="datetimeFigureOut">
               <a:rPr lang="nl-NL" smtClean="0"/>
-              <a:t>25-9-2024</a:t>
+              <a:t>27-9-2024</a:t>
             </a:fld>
             <a:endParaRPr lang="nl-NL"/>
           </a:p>
@@ -6651,7 +6651,7 @@
           <a:p>
             <a:fld id="{7E349EBC-E665-401F-8565-41EC489DE4F8}" type="datetimeFigureOut">
               <a:rPr lang="nl-NL" smtClean="0"/>
-              <a:t>25-9-2024</a:t>
+              <a:t>27-9-2024</a:t>
             </a:fld>
             <a:endParaRPr lang="nl-NL"/>
           </a:p>
@@ -6894,7 +6894,7 @@
           <a:p>
             <a:fld id="{7E349EBC-E665-401F-8565-41EC489DE4F8}" type="datetimeFigureOut">
               <a:rPr lang="nl-NL" smtClean="0"/>
-              <a:t>25-9-2024</a:t>
+              <a:t>27-9-2024</a:t>
             </a:fld>
             <a:endParaRPr lang="nl-NL"/>
           </a:p>
@@ -7513,6 +7513,110 @@
           </a:p>
         </p:txBody>
       </p:sp>
+      <p:sp>
+        <p:nvSpPr>
+          <p:cNvPr id="2" name="Isosceles Triangle 1">
+            <a:extLst>
+              <a:ext uri="{FF2B5EF4-FFF2-40B4-BE49-F238E27FC236}">
+                <a16:creationId xmlns:a16="http://schemas.microsoft.com/office/drawing/2014/main" id="{1057CE9E-F89D-083A-0E5C-B6EE58F8B07F}"/>
+              </a:ext>
+            </a:extLst>
+          </p:cNvPr>
+          <p:cNvSpPr/>
+          <p:nvPr/>
+        </p:nvSpPr>
+        <p:spPr>
+          <a:xfrm>
+            <a:off x="1052422" y="3743863"/>
+            <a:ext cx="3062379" cy="2596551"/>
+          </a:xfrm>
+          <a:prstGeom prst="triangle">
+            <a:avLst/>
+          </a:prstGeom>
+        </p:spPr>
+        <p:style>
+          <a:lnRef idx="2">
+            <a:schemeClr val="accent2">
+              <a:shade val="15000"/>
+            </a:schemeClr>
+          </a:lnRef>
+          <a:fillRef idx="1">
+            <a:schemeClr val="accent2"/>
+          </a:fillRef>
+          <a:effectRef idx="0">
+            <a:schemeClr val="accent2"/>
+          </a:effectRef>
+          <a:fontRef idx="minor">
+            <a:schemeClr val="lt1"/>
+          </a:fontRef>
+        </p:style>
+        <p:txBody>
+          <a:bodyPr rtlCol="0" anchor="ctr"/>
+          <a:lstStyle/>
+          <a:p>
+            <a:pPr algn="ctr"/>
+            <a:r>
+              <a:rPr lang="en-US" dirty="0"/>
+              <a:t>winding</a:t>
+            </a:r>
+            <a:endParaRPr lang="nl-NL" dirty="0"/>
+          </a:p>
+        </p:txBody>
+      </p:sp>
+      <p:sp>
+        <p:nvSpPr>
+          <p:cNvPr id="3" name="Arrow: Curved Right 2">
+            <a:extLst>
+              <a:ext uri="{FF2B5EF4-FFF2-40B4-BE49-F238E27FC236}">
+                <a16:creationId xmlns:a16="http://schemas.microsoft.com/office/drawing/2014/main" id="{F8A91D70-C6E7-2B3F-D7A1-7C863DC7BB0E}"/>
+              </a:ext>
+            </a:extLst>
+          </p:cNvPr>
+          <p:cNvSpPr/>
+          <p:nvPr/>
+        </p:nvSpPr>
+        <p:spPr>
+          <a:xfrm rot="10800000">
+            <a:off x="1820174" y="4273604"/>
+            <a:ext cx="2006861" cy="2094389"/>
+          </a:xfrm>
+          <a:prstGeom prst="curvedRightArrow">
+            <a:avLst>
+              <a:gd name="adj1" fmla="val 17916"/>
+              <a:gd name="adj2" fmla="val 37778"/>
+              <a:gd name="adj3" fmla="val 37937"/>
+            </a:avLst>
+          </a:prstGeom>
+        </p:spPr>
+        <p:style>
+          <a:lnRef idx="2">
+            <a:schemeClr val="accent4">
+              <a:shade val="15000"/>
+            </a:schemeClr>
+          </a:lnRef>
+          <a:fillRef idx="1">
+            <a:schemeClr val="accent4"/>
+          </a:fillRef>
+          <a:effectRef idx="0">
+            <a:schemeClr val="accent4"/>
+          </a:effectRef>
+          <a:fontRef idx="minor">
+            <a:schemeClr val="lt1"/>
+          </a:fontRef>
+        </p:style>
+        <p:txBody>
+          <a:bodyPr rtlCol="0" anchor="ctr"/>
+          <a:lstStyle/>
+          <a:p>
+            <a:pPr algn="ctr"/>
+            <a:endParaRPr lang="nl-NL">
+              <a:solidFill>
+                <a:schemeClr val="tx1"/>
+              </a:solidFill>
+            </a:endParaRPr>
+          </a:p>
+        </p:txBody>
+      </p:sp>
     </p:spTree>
     <p:extLst>
       <p:ext uri="{BB962C8B-B14F-4D97-AF65-F5344CB8AC3E}">

</xml_diff>